<commit_message>
Removed spell check errors
</commit_message>
<xml_diff>
--- a/C-CSVParser/doc/LayoutDiagram.pptx
+++ b/C-CSVParser/doc/LayoutDiagram.pptx
@@ -104,6 +104,11 @@
       </a:defRPr>
     </a:lvl9pPr>
   </p:defaultTextStyle>
+  <p:extLst>
+    <p:ext uri="{EFAFB233-063F-42B5-8137-9DF3F51BA10A}">
+      <p15:sldGuideLst xmlns:p15="http://schemas.microsoft.com/office/powerpoint/2012/main"/>
+    </p:ext>
+  </p:extLst>
 </p:presentation>
 </file>
 
@@ -254,7 +259,7 @@
           <a:p>
             <a:fld id="{EF79C8B7-B064-43AA-B85A-00C4D49D3391}" type="datetimeFigureOut">
               <a:rPr lang="en-US" smtClean="0"/>
-              <a:t>8/2/2022</a:t>
+              <a:t>8/7/2022</a:t>
             </a:fld>
             <a:endParaRPr lang="en-US" dirty="0"/>
           </a:p>
@@ -452,7 +457,7 @@
           <a:p>
             <a:fld id="{EF79C8B7-B064-43AA-B85A-00C4D49D3391}" type="datetimeFigureOut">
               <a:rPr lang="en-US" smtClean="0"/>
-              <a:t>8/2/2022</a:t>
+              <a:t>8/7/2022</a:t>
             </a:fld>
             <a:endParaRPr lang="en-US" dirty="0"/>
           </a:p>
@@ -660,7 +665,7 @@
           <a:p>
             <a:fld id="{EF79C8B7-B064-43AA-B85A-00C4D49D3391}" type="datetimeFigureOut">
               <a:rPr lang="en-US" smtClean="0"/>
-              <a:t>8/2/2022</a:t>
+              <a:t>8/7/2022</a:t>
             </a:fld>
             <a:endParaRPr lang="en-US" dirty="0"/>
           </a:p>
@@ -858,7 +863,7 @@
           <a:p>
             <a:fld id="{EF79C8B7-B064-43AA-B85A-00C4D49D3391}" type="datetimeFigureOut">
               <a:rPr lang="en-US" smtClean="0"/>
-              <a:t>8/2/2022</a:t>
+              <a:t>8/7/2022</a:t>
             </a:fld>
             <a:endParaRPr lang="en-US" dirty="0"/>
           </a:p>
@@ -1133,7 +1138,7 @@
           <a:p>
             <a:fld id="{EF79C8B7-B064-43AA-B85A-00C4D49D3391}" type="datetimeFigureOut">
               <a:rPr lang="en-US" smtClean="0"/>
-              <a:t>8/2/2022</a:t>
+              <a:t>8/7/2022</a:t>
             </a:fld>
             <a:endParaRPr lang="en-US" dirty="0"/>
           </a:p>
@@ -1398,7 +1403,7 @@
           <a:p>
             <a:fld id="{EF79C8B7-B064-43AA-B85A-00C4D49D3391}" type="datetimeFigureOut">
               <a:rPr lang="en-US" smtClean="0"/>
-              <a:t>8/2/2022</a:t>
+              <a:t>8/7/2022</a:t>
             </a:fld>
             <a:endParaRPr lang="en-US" dirty="0"/>
           </a:p>
@@ -1810,7 +1815,7 @@
           <a:p>
             <a:fld id="{EF79C8B7-B064-43AA-B85A-00C4D49D3391}" type="datetimeFigureOut">
               <a:rPr lang="en-US" smtClean="0"/>
-              <a:t>8/2/2022</a:t>
+              <a:t>8/7/2022</a:t>
             </a:fld>
             <a:endParaRPr lang="en-US" dirty="0"/>
           </a:p>
@@ -1951,7 +1956,7 @@
           <a:p>
             <a:fld id="{EF79C8B7-B064-43AA-B85A-00C4D49D3391}" type="datetimeFigureOut">
               <a:rPr lang="en-US" smtClean="0"/>
-              <a:t>8/2/2022</a:t>
+              <a:t>8/7/2022</a:t>
             </a:fld>
             <a:endParaRPr lang="en-US" dirty="0"/>
           </a:p>
@@ -2064,7 +2069,7 @@
           <a:p>
             <a:fld id="{EF79C8B7-B064-43AA-B85A-00C4D49D3391}" type="datetimeFigureOut">
               <a:rPr lang="en-US" smtClean="0"/>
-              <a:t>8/2/2022</a:t>
+              <a:t>8/7/2022</a:t>
             </a:fld>
             <a:endParaRPr lang="en-US" dirty="0"/>
           </a:p>
@@ -2375,7 +2380,7 @@
           <a:p>
             <a:fld id="{EF79C8B7-B064-43AA-B85A-00C4D49D3391}" type="datetimeFigureOut">
               <a:rPr lang="en-US" smtClean="0"/>
-              <a:t>8/2/2022</a:t>
+              <a:t>8/7/2022</a:t>
             </a:fld>
             <a:endParaRPr lang="en-US" dirty="0"/>
           </a:p>
@@ -2663,7 +2668,7 @@
           <a:p>
             <a:fld id="{EF79C8B7-B064-43AA-B85A-00C4D49D3391}" type="datetimeFigureOut">
               <a:rPr lang="en-US" smtClean="0"/>
-              <a:t>8/2/2022</a:t>
+              <a:t>8/7/2022</a:t>
             </a:fld>
             <a:endParaRPr lang="en-US" dirty="0"/>
           </a:p>
@@ -2904,7 +2909,7 @@
           <a:p>
             <a:fld id="{EF79C8B7-B064-43AA-B85A-00C4D49D3391}" type="datetimeFigureOut">
               <a:rPr lang="en-US" smtClean="0"/>
-              <a:t>8/2/2022</a:t>
+              <a:t>8/7/2022</a:t>
             </a:fld>
             <a:endParaRPr lang="en-US" dirty="0"/>
           </a:p>
@@ -4301,10 +4306,9 @@
           <a:lstStyle/>
           <a:p>
             <a:r>
-              <a:rPr lang="en-US" sz="1200" i="1" dirty="0" err="1"/>
+              <a:rPr lang="en-US" sz="1200" i="1" dirty="0"/>
               <a:t>list_head</a:t>
             </a:r>
-            <a:endParaRPr lang="en-US" sz="1200" i="1" dirty="0"/>
           </a:p>
         </p:txBody>
       </p:sp>
@@ -4337,10 +4341,9 @@
           <a:lstStyle/>
           <a:p>
             <a:r>
-              <a:rPr lang="en-US" sz="1200" i="1" dirty="0" err="1"/>
+              <a:rPr lang="en-US" sz="1200" i="1" dirty="0"/>
               <a:t>list_tail</a:t>
             </a:r>
-            <a:endParaRPr lang="en-US" sz="1200" i="1" dirty="0"/>
           </a:p>
         </p:txBody>
       </p:sp>
@@ -4872,10 +4875,9 @@
           <a:lstStyle/>
           <a:p>
             <a:r>
-              <a:rPr lang="en-US" sz="1200" i="1" dirty="0" err="1"/>
+              <a:rPr lang="en-US" sz="1200" i="1" dirty="0"/>
               <a:t>list_head</a:t>
             </a:r>
-            <a:endParaRPr lang="en-US" sz="1200" i="1" dirty="0"/>
           </a:p>
         </p:txBody>
       </p:sp>
@@ -4961,10 +4963,9 @@
           <a:lstStyle/>
           <a:p>
             <a:r>
-              <a:rPr lang="en-US" sz="1200" i="1" dirty="0" err="1"/>
+              <a:rPr lang="en-US" sz="1200" i="1" dirty="0"/>
               <a:t>list_tail</a:t>
             </a:r>
-            <a:endParaRPr lang="en-US" sz="1200" i="1" dirty="0"/>
           </a:p>
         </p:txBody>
       </p:sp>

</xml_diff>